<commit_message>
forgot something in module image
</commit_message>
<xml_diff>
--- a/jcgs-paper-2016/images/images.pptx
+++ b/jcgs-paper-2016/images/images.pptx
@@ -5081,7 +5081,7 @@
         </p:nvSpPr>
         <p:spPr>
           <a:xfrm>
-            <a:off x="221591" y="1200190"/>
+            <a:off x="164891" y="1200190"/>
             <a:ext cx="2590799" cy="307777"/>
           </a:xfrm>
           <a:prstGeom prst="rect">
@@ -5106,7 +5106,20 @@
                 <a:latin typeface="Cambria Math" panose="02040503050406030204" pitchFamily="18" charset="0"/>
                 <a:ea typeface="Cambria Math" panose="02040503050406030204" pitchFamily="18" charset="0"/>
               </a:rPr>
-              <a:t>modules/nonparametric/</a:t>
+              <a:t>statistics/</a:t>
+            </a:r>
+            <a:r>
+              <a:rPr lang="en-US" sz="1400" dirty="0" smtClean="0">
+                <a:solidFill>
+                  <a:schemeClr val="tx1">
+                    <a:lumMod val="65000"/>
+                    <a:lumOff val="35000"/>
+                  </a:schemeClr>
+                </a:solidFill>
+                <a:latin typeface="Cambria Math" panose="02040503050406030204" pitchFamily="18" charset="0"/>
+                <a:ea typeface="Cambria Math" panose="02040503050406030204" pitchFamily="18" charset="0"/>
+              </a:rPr>
+              <a:t>nonparametric/</a:t>
             </a:r>
             <a:endParaRPr lang="en-US" sz="1400" dirty="0">
               <a:solidFill>
@@ -5154,7 +5167,20 @@
                 <a:latin typeface="Cambria Math" panose="02040503050406030204" pitchFamily="18" charset="0"/>
                 <a:ea typeface="Cambria Math" panose="02040503050406030204" pitchFamily="18" charset="0"/>
               </a:rPr>
-              <a:t>modules/nonparametric/</a:t>
+              <a:t>statistics/</a:t>
+            </a:r>
+            <a:r>
+              <a:rPr lang="en-US" sz="1400" dirty="0" smtClean="0">
+                <a:solidFill>
+                  <a:schemeClr val="tx1">
+                    <a:lumMod val="65000"/>
+                    <a:lumOff val="35000"/>
+                  </a:schemeClr>
+                </a:solidFill>
+                <a:latin typeface="Cambria Math" panose="02040503050406030204" pitchFamily="18" charset="0"/>
+                <a:ea typeface="Cambria Math" panose="02040503050406030204" pitchFamily="18" charset="0"/>
+              </a:rPr>
+              <a:t>nonparametric/</a:t>
             </a:r>
             <a:endParaRPr lang="en-US" sz="1400" dirty="0">
               <a:solidFill>
@@ -5701,10 +5727,6 @@
               </a:rPr>
               <a:t>eading/module</a:t>
             </a:r>
-            <a:endParaRPr lang="en-US" sz="1100" dirty="0" smtClean="0">
-              <a:latin typeface="Courier New" panose="02070309020205020404" pitchFamily="49" charset="0"/>
-              <a:cs typeface="Courier New" panose="02070309020205020404" pitchFamily="49" charset="0"/>
-            </a:endParaRPr>
           </a:p>
           <a:p>
             <a:r>
@@ -5721,10 +5743,6 @@
               </a:rPr>
               <a:t>ata/sources</a:t>
             </a:r>
-            <a:endParaRPr lang="en-US" sz="1100" dirty="0" smtClean="0">
-              <a:latin typeface="Courier New" panose="02070309020205020404" pitchFamily="49" charset="0"/>
-              <a:cs typeface="Courier New" panose="02070309020205020404" pitchFamily="49" charset="0"/>
-            </a:endParaRPr>
           </a:p>
           <a:p>
             <a:r>
@@ -5741,10 +5759,6 @@
               </a:rPr>
               <a:t>ata/transform</a:t>
             </a:r>
-            <a:endParaRPr lang="en-US" sz="1100" dirty="0" smtClean="0">
-              <a:latin typeface="Courier New" panose="02070309020205020404" pitchFamily="49" charset="0"/>
-              <a:cs typeface="Courier New" panose="02070309020205020404" pitchFamily="49" charset="0"/>
-            </a:endParaRPr>
           </a:p>
           <a:p>
             <a:r>
@@ -5761,10 +5775,6 @@
               </a:rPr>
               <a:t>ummaries/graphical</a:t>
             </a:r>
-            <a:endParaRPr lang="en-US" sz="1100" dirty="0" smtClean="0">
-              <a:latin typeface="Courier New" panose="02070309020205020404" pitchFamily="49" charset="0"/>
-              <a:cs typeface="Courier New" panose="02070309020205020404" pitchFamily="49" charset="0"/>
-            </a:endParaRPr>
           </a:p>
           <a:p>
             <a:r>
@@ -5774,10 +5784,6 @@
               </a:rPr>
               <a:t>Summaries/numerical</a:t>
             </a:r>
-            <a:endParaRPr lang="en-US" sz="1100" dirty="0" smtClean="0">
-              <a:latin typeface="Courier New" panose="02070309020205020404" pitchFamily="49" charset="0"/>
-              <a:cs typeface="Courier New" panose="02070309020205020404" pitchFamily="49" charset="0"/>
-            </a:endParaRPr>
           </a:p>
           <a:p>
             <a:r>
@@ -5794,10 +5800,6 @@
               </a:rPr>
               <a:t>tatistics/contingency</a:t>
             </a:r>
-            <a:endParaRPr lang="en-US" sz="1100" dirty="0" smtClean="0">
-              <a:latin typeface="Courier New" panose="02070309020205020404" pitchFamily="49" charset="0"/>
-              <a:cs typeface="Courier New" panose="02070309020205020404" pitchFamily="49" charset="0"/>
-            </a:endParaRPr>
           </a:p>
           <a:p>
             <a:r>
@@ -5814,10 +5816,6 @@
               </a:rPr>
               <a:t>tatistics/regression</a:t>
             </a:r>
-            <a:endParaRPr lang="en-US" sz="1100" dirty="0" smtClean="0">
-              <a:latin typeface="Courier New" panose="02070309020205020404" pitchFamily="49" charset="0"/>
-              <a:cs typeface="Courier New" panose="02070309020205020404" pitchFamily="49" charset="0"/>
-            </a:endParaRPr>
           </a:p>
           <a:p>
             <a:r>

</xml_diff>

<commit_message>
image statistics -> inference
</commit_message>
<xml_diff>
--- a/jcgs-paper-2016/images/images.pptx
+++ b/jcgs-paper-2016/images/images.pptx
@@ -303,7 +303,7 @@
           <a:p>
             <a:fld id="{F74648D0-5642-438F-8F02-AC3B4D73B72D}" type="datetimeFigureOut">
               <a:rPr lang="en-US" smtClean="0"/>
-              <a:t>1/20/16</a:t>
+              <a:t>6/6/16</a:t>
             </a:fld>
             <a:endParaRPr lang="en-US"/>
           </a:p>
@@ -473,7 +473,7 @@
           <a:p>
             <a:fld id="{F74648D0-5642-438F-8F02-AC3B4D73B72D}" type="datetimeFigureOut">
               <a:rPr lang="en-US" smtClean="0"/>
-              <a:t>1/20/16</a:t>
+              <a:t>6/6/16</a:t>
             </a:fld>
             <a:endParaRPr lang="en-US"/>
           </a:p>
@@ -653,7 +653,7 @@
           <a:p>
             <a:fld id="{F74648D0-5642-438F-8F02-AC3B4D73B72D}" type="datetimeFigureOut">
               <a:rPr lang="en-US" smtClean="0"/>
-              <a:t>1/20/16</a:t>
+              <a:t>6/6/16</a:t>
             </a:fld>
             <a:endParaRPr lang="en-US"/>
           </a:p>
@@ -823,7 +823,7 @@
           <a:p>
             <a:fld id="{F74648D0-5642-438F-8F02-AC3B4D73B72D}" type="datetimeFigureOut">
               <a:rPr lang="en-US" smtClean="0"/>
-              <a:t>1/20/16</a:t>
+              <a:t>6/6/16</a:t>
             </a:fld>
             <a:endParaRPr lang="en-US"/>
           </a:p>
@@ -1069,7 +1069,7 @@
           <a:p>
             <a:fld id="{F74648D0-5642-438F-8F02-AC3B4D73B72D}" type="datetimeFigureOut">
               <a:rPr lang="en-US" smtClean="0"/>
-              <a:t>1/20/16</a:t>
+              <a:t>6/6/16</a:t>
             </a:fld>
             <a:endParaRPr lang="en-US"/>
           </a:p>
@@ -1357,7 +1357,7 @@
           <a:p>
             <a:fld id="{F74648D0-5642-438F-8F02-AC3B4D73B72D}" type="datetimeFigureOut">
               <a:rPr lang="en-US" smtClean="0"/>
-              <a:t>1/20/16</a:t>
+              <a:t>6/6/16</a:t>
             </a:fld>
             <a:endParaRPr lang="en-US"/>
           </a:p>
@@ -1779,7 +1779,7 @@
           <a:p>
             <a:fld id="{F74648D0-5642-438F-8F02-AC3B4D73B72D}" type="datetimeFigureOut">
               <a:rPr lang="en-US" smtClean="0"/>
-              <a:t>1/20/16</a:t>
+              <a:t>6/6/16</a:t>
             </a:fld>
             <a:endParaRPr lang="en-US"/>
           </a:p>
@@ -1897,7 +1897,7 @@
           <a:p>
             <a:fld id="{F74648D0-5642-438F-8F02-AC3B4D73B72D}" type="datetimeFigureOut">
               <a:rPr lang="en-US" smtClean="0"/>
-              <a:t>1/20/16</a:t>
+              <a:t>6/6/16</a:t>
             </a:fld>
             <a:endParaRPr lang="en-US"/>
           </a:p>
@@ -1992,7 +1992,7 @@
           <a:p>
             <a:fld id="{F74648D0-5642-438F-8F02-AC3B4D73B72D}" type="datetimeFigureOut">
               <a:rPr lang="en-US" smtClean="0"/>
-              <a:t>1/20/16</a:t>
+              <a:t>6/6/16</a:t>
             </a:fld>
             <a:endParaRPr lang="en-US"/>
           </a:p>
@@ -2269,7 +2269,7 @@
           <a:p>
             <a:fld id="{F74648D0-5642-438F-8F02-AC3B4D73B72D}" type="datetimeFigureOut">
               <a:rPr lang="en-US" smtClean="0"/>
-              <a:t>1/20/16</a:t>
+              <a:t>6/6/16</a:t>
             </a:fld>
             <a:endParaRPr lang="en-US"/>
           </a:p>
@@ -2522,7 +2522,7 @@
           <a:p>
             <a:fld id="{F74648D0-5642-438F-8F02-AC3B4D73B72D}" type="datetimeFigureOut">
               <a:rPr lang="en-US" smtClean="0"/>
-              <a:t>1/20/16</a:t>
+              <a:t>6/6/16</a:t>
             </a:fld>
             <a:endParaRPr lang="en-US"/>
           </a:p>
@@ -2735,7 +2735,7 @@
           <a:p>
             <a:fld id="{F74648D0-5642-438F-8F02-AC3B4D73B72D}" type="datetimeFigureOut">
               <a:rPr lang="en-US" smtClean="0"/>
-              <a:t>1/20/16</a:t>
+              <a:t>6/6/16</a:t>
             </a:fld>
             <a:endParaRPr lang="en-US"/>
           </a:p>
@@ -5106,20 +5106,7 @@
                 <a:latin typeface="Cambria Math" panose="02040503050406030204" pitchFamily="18" charset="0"/>
                 <a:ea typeface="Cambria Math" panose="02040503050406030204" pitchFamily="18" charset="0"/>
               </a:rPr>
-              <a:t>statistics/</a:t>
-            </a:r>
-            <a:r>
-              <a:rPr lang="en-US" sz="1400" dirty="0" smtClean="0">
-                <a:solidFill>
-                  <a:schemeClr val="tx1">
-                    <a:lumMod val="65000"/>
-                    <a:lumOff val="35000"/>
-                  </a:schemeClr>
-                </a:solidFill>
-                <a:latin typeface="Cambria Math" panose="02040503050406030204" pitchFamily="18" charset="0"/>
-                <a:ea typeface="Cambria Math" panose="02040503050406030204" pitchFamily="18" charset="0"/>
-              </a:rPr>
-              <a:t>nonparametric/</a:t>
+              <a:t>statistics/nonparametric/</a:t>
             </a:r>
             <a:endParaRPr lang="en-US" sz="1400" dirty="0">
               <a:solidFill>
@@ -5167,20 +5154,7 @@
                 <a:latin typeface="Cambria Math" panose="02040503050406030204" pitchFamily="18" charset="0"/>
                 <a:ea typeface="Cambria Math" panose="02040503050406030204" pitchFamily="18" charset="0"/>
               </a:rPr>
-              <a:t>statistics/</a:t>
-            </a:r>
-            <a:r>
-              <a:rPr lang="en-US" sz="1400" dirty="0" smtClean="0">
-                <a:solidFill>
-                  <a:schemeClr val="tx1">
-                    <a:lumMod val="65000"/>
-                    <a:lumOff val="35000"/>
-                  </a:schemeClr>
-                </a:solidFill>
-                <a:latin typeface="Cambria Math" panose="02040503050406030204" pitchFamily="18" charset="0"/>
-                <a:ea typeface="Cambria Math" panose="02040503050406030204" pitchFamily="18" charset="0"/>
-              </a:rPr>
-              <a:t>nonparametric/</a:t>
+              <a:t>statistics/nonparametric/</a:t>
             </a:r>
             <a:endParaRPr lang="en-US" sz="1400" dirty="0">
               <a:solidFill>
@@ -5976,13 +5950,13 @@
               </a:ext>
             </a:extLst>
           </a:blip>
-          <a:srcRect l="3676" t="3031" r="3682" b="7632"/>
+          <a:srcRect l="3596" t="3298" r="3519" b="8502"/>
           <a:stretch/>
         </p:blipFill>
         <p:spPr>
           <a:xfrm>
-            <a:off x="1" y="476289"/>
-            <a:ext cx="9144000" cy="5273204"/>
+            <a:off x="0" y="498973"/>
+            <a:ext cx="9144000" cy="5225411"/>
           </a:xfrm>
           <a:prstGeom prst="rect">
             <a:avLst/>
@@ -6063,7 +6037,7 @@
         <p:spPr>
           <a:xfrm>
             <a:off x="0" y="1396004"/>
-            <a:ext cx="1545465" cy="2750022"/>
+            <a:ext cx="1545465" cy="2391631"/>
           </a:xfrm>
           <a:prstGeom prst="rect">
             <a:avLst/>
@@ -6122,7 +6096,7 @@
         <p:spPr>
           <a:xfrm>
             <a:off x="1545465" y="1396004"/>
-            <a:ext cx="2551814" cy="2750022"/>
+            <a:ext cx="2551814" cy="2391631"/>
           </a:xfrm>
           <a:prstGeom prst="rect">
             <a:avLst/>
@@ -6187,7 +6161,7 @@
         <p:spPr>
           <a:xfrm>
             <a:off x="4097278" y="1396004"/>
-            <a:ext cx="5046721" cy="2750022"/>
+            <a:ext cx="5046721" cy="2391631"/>
           </a:xfrm>
           <a:prstGeom prst="rect">
             <a:avLst/>
@@ -6251,8 +6225,8 @@
         </p:nvSpPr>
         <p:spPr>
           <a:xfrm>
-            <a:off x="0" y="4156244"/>
-            <a:ext cx="9144000" cy="1553727"/>
+            <a:off x="0" y="3776294"/>
+            <a:ext cx="9144000" cy="1933677"/>
           </a:xfrm>
           <a:prstGeom prst="rect">
             <a:avLst/>
@@ -6707,7 +6681,7 @@
         </p:nvGrpSpPr>
         <p:grpSpPr>
           <a:xfrm>
-            <a:off x="-131786" y="3997579"/>
+            <a:off x="-131786" y="3600679"/>
             <a:ext cx="371391" cy="298288"/>
             <a:chOff x="3426379" y="179720"/>
             <a:chExt cx="371391" cy="298288"/>

</xml_diff>

<commit_message>
change image to inference
</commit_message>
<xml_diff>
--- a/jcgs-paper-2016/images/images.pptx
+++ b/jcgs-paper-2016/images/images.pptx
@@ -303,7 +303,7 @@
           <a:p>
             <a:fld id="{F74648D0-5642-438F-8F02-AC3B4D73B72D}" type="datetimeFigureOut">
               <a:rPr lang="en-US" smtClean="0"/>
-              <a:t>6/6/16</a:t>
+              <a:t>6/15/16</a:t>
             </a:fld>
             <a:endParaRPr lang="en-US"/>
           </a:p>
@@ -473,7 +473,7 @@
           <a:p>
             <a:fld id="{F74648D0-5642-438F-8F02-AC3B4D73B72D}" type="datetimeFigureOut">
               <a:rPr lang="en-US" smtClean="0"/>
-              <a:t>6/6/16</a:t>
+              <a:t>6/15/16</a:t>
             </a:fld>
             <a:endParaRPr lang="en-US"/>
           </a:p>
@@ -653,7 +653,7 @@
           <a:p>
             <a:fld id="{F74648D0-5642-438F-8F02-AC3B4D73B72D}" type="datetimeFigureOut">
               <a:rPr lang="en-US" smtClean="0"/>
-              <a:t>6/6/16</a:t>
+              <a:t>6/15/16</a:t>
             </a:fld>
             <a:endParaRPr lang="en-US"/>
           </a:p>
@@ -823,7 +823,7 @@
           <a:p>
             <a:fld id="{F74648D0-5642-438F-8F02-AC3B4D73B72D}" type="datetimeFigureOut">
               <a:rPr lang="en-US" smtClean="0"/>
-              <a:t>6/6/16</a:t>
+              <a:t>6/15/16</a:t>
             </a:fld>
             <a:endParaRPr lang="en-US"/>
           </a:p>
@@ -1069,7 +1069,7 @@
           <a:p>
             <a:fld id="{F74648D0-5642-438F-8F02-AC3B4D73B72D}" type="datetimeFigureOut">
               <a:rPr lang="en-US" smtClean="0"/>
-              <a:t>6/6/16</a:t>
+              <a:t>6/15/16</a:t>
             </a:fld>
             <a:endParaRPr lang="en-US"/>
           </a:p>
@@ -1357,7 +1357,7 @@
           <a:p>
             <a:fld id="{F74648D0-5642-438F-8F02-AC3B4D73B72D}" type="datetimeFigureOut">
               <a:rPr lang="en-US" smtClean="0"/>
-              <a:t>6/6/16</a:t>
+              <a:t>6/15/16</a:t>
             </a:fld>
             <a:endParaRPr lang="en-US"/>
           </a:p>
@@ -1779,7 +1779,7 @@
           <a:p>
             <a:fld id="{F74648D0-5642-438F-8F02-AC3B4D73B72D}" type="datetimeFigureOut">
               <a:rPr lang="en-US" smtClean="0"/>
-              <a:t>6/6/16</a:t>
+              <a:t>6/15/16</a:t>
             </a:fld>
             <a:endParaRPr lang="en-US"/>
           </a:p>
@@ -1897,7 +1897,7 @@
           <a:p>
             <a:fld id="{F74648D0-5642-438F-8F02-AC3B4D73B72D}" type="datetimeFigureOut">
               <a:rPr lang="en-US" smtClean="0"/>
-              <a:t>6/6/16</a:t>
+              <a:t>6/15/16</a:t>
             </a:fld>
             <a:endParaRPr lang="en-US"/>
           </a:p>
@@ -1992,7 +1992,7 @@
           <a:p>
             <a:fld id="{F74648D0-5642-438F-8F02-AC3B4D73B72D}" type="datetimeFigureOut">
               <a:rPr lang="en-US" smtClean="0"/>
-              <a:t>6/6/16</a:t>
+              <a:t>6/15/16</a:t>
             </a:fld>
             <a:endParaRPr lang="en-US"/>
           </a:p>
@@ -2269,7 +2269,7 @@
           <a:p>
             <a:fld id="{F74648D0-5642-438F-8F02-AC3B4D73B72D}" type="datetimeFigureOut">
               <a:rPr lang="en-US" smtClean="0"/>
-              <a:t>6/6/16</a:t>
+              <a:t>6/15/16</a:t>
             </a:fld>
             <a:endParaRPr lang="en-US"/>
           </a:p>
@@ -2522,7 +2522,7 @@
           <a:p>
             <a:fld id="{F74648D0-5642-438F-8F02-AC3B4D73B72D}" type="datetimeFigureOut">
               <a:rPr lang="en-US" smtClean="0"/>
-              <a:t>6/6/16</a:t>
+              <a:t>6/15/16</a:t>
             </a:fld>
             <a:endParaRPr lang="en-US"/>
           </a:p>
@@ -2735,7 +2735,7 @@
           <a:p>
             <a:fld id="{F74648D0-5642-438F-8F02-AC3B4D73B72D}" type="datetimeFigureOut">
               <a:rPr lang="en-US" smtClean="0"/>
-              <a:t>6/6/16</a:t>
+              <a:t>6/15/16</a:t>
             </a:fld>
             <a:endParaRPr lang="en-US"/>
           </a:p>
@@ -3227,7 +3227,7 @@
         </p:nvSpPr>
         <p:spPr>
           <a:xfrm>
-            <a:off x="2288360" y="231920"/>
+            <a:off x="2333720" y="231920"/>
             <a:ext cx="1981200" cy="2074273"/>
           </a:xfrm>
           <a:prstGeom prst="snip1Rect">
@@ -3273,7 +3273,7 @@
         </p:nvSpPr>
         <p:spPr>
           <a:xfrm>
-            <a:off x="4415030" y="231920"/>
+            <a:off x="4460390" y="231920"/>
             <a:ext cx="1981200" cy="2074273"/>
           </a:xfrm>
           <a:prstGeom prst="snip1Rect">
@@ -3319,7 +3319,7 @@
         </p:nvSpPr>
         <p:spPr>
           <a:xfrm>
-            <a:off x="2253724" y="245775"/>
+            <a:off x="2299084" y="245775"/>
             <a:ext cx="1981200" cy="381000"/>
           </a:xfrm>
           <a:prstGeom prst="rect">
@@ -3367,7 +3367,7 @@
         </p:nvSpPr>
         <p:spPr>
           <a:xfrm>
-            <a:off x="4415030" y="252703"/>
+            <a:off x="4460390" y="252703"/>
             <a:ext cx="1981200" cy="381000"/>
           </a:xfrm>
           <a:prstGeom prst="rect">
@@ -3428,7 +3428,7 @@
         </p:nvSpPr>
         <p:spPr>
           <a:xfrm>
-            <a:off x="2288360" y="626775"/>
+            <a:off x="2333720" y="626775"/>
             <a:ext cx="1981200" cy="1615827"/>
           </a:xfrm>
           <a:prstGeom prst="rect">
@@ -3519,7 +3519,7 @@
         </p:nvSpPr>
         <p:spPr>
           <a:xfrm>
-            <a:off x="4415030" y="626775"/>
+            <a:off x="4460390" y="626775"/>
             <a:ext cx="1981200" cy="1615827"/>
           </a:xfrm>
           <a:prstGeom prst="rect">
@@ -3613,7 +3613,7 @@
         </p:nvSpPr>
         <p:spPr>
           <a:xfrm>
-            <a:off x="2343778" y="1244946"/>
+            <a:off x="2389138" y="1244946"/>
             <a:ext cx="1870364" cy="727018"/>
           </a:xfrm>
           <a:prstGeom prst="rect">
@@ -3662,7 +3662,7 @@
         </p:nvSpPr>
         <p:spPr>
           <a:xfrm>
-            <a:off x="4470448" y="1244946"/>
+            <a:off x="4515808" y="1244946"/>
             <a:ext cx="1870364" cy="743729"/>
           </a:xfrm>
           <a:prstGeom prst="rect">
@@ -3713,7 +3713,7 @@
         </p:nvCxnSpPr>
         <p:spPr>
           <a:xfrm rot="10800000" flipH="1" flipV="1">
-            <a:off x="2343777" y="1608454"/>
+            <a:off x="2389137" y="1608454"/>
             <a:ext cx="1114489" cy="2259369"/>
           </a:xfrm>
           <a:prstGeom prst="curvedConnector3">
@@ -3758,7 +3758,7 @@
         </p:nvCxnSpPr>
         <p:spPr>
           <a:xfrm flipH="1">
-            <a:off x="5647286" y="1616811"/>
+            <a:off x="5692646" y="1616811"/>
             <a:ext cx="693526" cy="2251013"/>
           </a:xfrm>
           <a:prstGeom prst="curvedConnector3">
@@ -4693,7 +4693,7 @@
         <p:spPr>
           <a:xfrm>
             <a:off x="415560" y="3015123"/>
-            <a:ext cx="2396828" cy="2308324"/>
+            <a:ext cx="2396828" cy="2169825"/>
           </a:xfrm>
           <a:prstGeom prst="rect">
             <a:avLst/>
@@ -4731,13 +4731,217 @@
                 <a:latin typeface="Courier New" panose="02070309020205020404" pitchFamily="49" charset="0"/>
                 <a:cs typeface="Courier New" panose="02070309020205020404" pitchFamily="49" charset="0"/>
               </a:rPr>
-              <a:t>function </a:t>
+              <a:t>function(</a:t>
+            </a:r>
+            <a:r>
+              <a:rPr lang="en-US" sz="900" dirty="0" err="1">
+                <a:latin typeface="Courier New" panose="02070309020205020404" pitchFamily="49" charset="0"/>
+                <a:cs typeface="Courier New" panose="02070309020205020404" pitchFamily="49" charset="0"/>
+              </a:rPr>
+              <a:t>intro.data</a:t>
             </a:r>
             <a:r>
               <a:rPr lang="en-US" sz="900" dirty="0">
                 <a:latin typeface="Courier New" panose="02070309020205020404" pitchFamily="49" charset="0"/>
                 <a:cs typeface="Courier New" panose="02070309020205020404" pitchFamily="49" charset="0"/>
               </a:rPr>
+              <a:t>, x, y, </a:t>
+            </a:r>
+            <a:r>
+              <a:rPr lang="en-US" sz="900" dirty="0" err="1">
+                <a:latin typeface="Courier New" panose="02070309020205020404" pitchFamily="49" charset="0"/>
+                <a:cs typeface="Courier New" panose="02070309020205020404" pitchFamily="49" charset="0"/>
+              </a:rPr>
+              <a:t>conflevel</a:t>
+            </a:r>
+            <a:r>
+              <a:rPr lang="en-US" sz="900" dirty="0">
+                <a:latin typeface="Courier New" panose="02070309020205020404" pitchFamily="49" charset="0"/>
+                <a:cs typeface="Courier New" panose="02070309020205020404" pitchFamily="49" charset="0"/>
+              </a:rPr>
+              <a:t>, </a:t>
+            </a:r>
+            <a:r>
+              <a:rPr lang="en-US" sz="900" dirty="0" err="1">
+                <a:latin typeface="Courier New" panose="02070309020205020404" pitchFamily="49" charset="0"/>
+                <a:cs typeface="Courier New" panose="02070309020205020404" pitchFamily="49" charset="0"/>
+              </a:rPr>
+              <a:t>althyp</a:t>
+            </a:r>
+            <a:r>
+              <a:rPr lang="en-US" sz="900" dirty="0">
+                <a:latin typeface="Courier New" panose="02070309020205020404" pitchFamily="49" charset="0"/>
+                <a:cs typeface="Courier New" panose="02070309020205020404" pitchFamily="49" charset="0"/>
+              </a:rPr>
+              <a:t>, </a:t>
+            </a:r>
+            <a:r>
+              <a:rPr lang="en-US" sz="900" dirty="0" err="1">
+                <a:latin typeface="Courier New" panose="02070309020205020404" pitchFamily="49" charset="0"/>
+                <a:cs typeface="Courier New" panose="02070309020205020404" pitchFamily="49" charset="0"/>
+              </a:rPr>
+              <a:t>hypval</a:t>
+            </a:r>
+            <a:r>
+              <a:rPr lang="en-US" sz="900" dirty="0">
+                <a:latin typeface="Courier New" panose="02070309020205020404" pitchFamily="49" charset="0"/>
+                <a:cs typeface="Courier New" panose="02070309020205020404" pitchFamily="49" charset="0"/>
+              </a:rPr>
+              <a:t>) </a:t>
+            </a:r>
+            <a:r>
+              <a:rPr lang="en-US" sz="900" dirty="0" smtClean="0">
+                <a:latin typeface="Courier New" panose="02070309020205020404" pitchFamily="49" charset="0"/>
+                <a:cs typeface="Courier New" panose="02070309020205020404" pitchFamily="49" charset="0"/>
+              </a:rPr>
+              <a:t>{</a:t>
+            </a:r>
+          </a:p>
+          <a:p>
+            <a:endParaRPr lang="en-US" sz="900" dirty="0" smtClean="0">
+              <a:latin typeface="Courier New" panose="02070309020205020404" pitchFamily="49" charset="0"/>
+              <a:cs typeface="Courier New" panose="02070309020205020404" pitchFamily="49" charset="0"/>
+            </a:endParaRPr>
+          </a:p>
+          <a:p>
+            <a:r>
+              <a:rPr lang="en-US" sz="900" dirty="0" smtClean="0">
+                <a:latin typeface="Courier New" panose="02070309020205020404" pitchFamily="49" charset="0"/>
+                <a:cs typeface="Courier New" panose="02070309020205020404" pitchFamily="49" charset="0"/>
+              </a:rPr>
+              <a:t>interpolate</a:t>
+            </a:r>
+            <a:r>
+              <a:rPr lang="en-US" sz="900" dirty="0">
+                <a:latin typeface="Courier New" panose="02070309020205020404" pitchFamily="49" charset="0"/>
+                <a:cs typeface="Courier New" panose="02070309020205020404" pitchFamily="49" charset="0"/>
+              </a:rPr>
+              <a:t>(~(</a:t>
+            </a:r>
+            <a:r>
+              <a:rPr lang="en-US" sz="900" dirty="0" err="1">
+                <a:latin typeface="Courier New" panose="02070309020205020404" pitchFamily="49" charset="0"/>
+                <a:cs typeface="Courier New" panose="02070309020205020404" pitchFamily="49" charset="0"/>
+              </a:rPr>
+              <a:t>wilcox.test</a:t>
+            </a:r>
+            <a:r>
+              <a:rPr lang="en-US" sz="900" dirty="0">
+                <a:latin typeface="Courier New" panose="02070309020205020404" pitchFamily="49" charset="0"/>
+                <a:cs typeface="Courier New" panose="02070309020205020404" pitchFamily="49" charset="0"/>
+              </a:rPr>
+              <a:t>(x = </a:t>
+            </a:r>
+            <a:r>
+              <a:rPr lang="en-US" sz="900" dirty="0" err="1">
+                <a:latin typeface="Courier New" panose="02070309020205020404" pitchFamily="49" charset="0"/>
+                <a:cs typeface="Courier New" panose="02070309020205020404" pitchFamily="49" charset="0"/>
+              </a:rPr>
+              <a:t>df$x</a:t>
+            </a:r>
+            <a:r>
+              <a:rPr lang="en-US" sz="900" dirty="0">
+                <a:latin typeface="Courier New" panose="02070309020205020404" pitchFamily="49" charset="0"/>
+                <a:cs typeface="Courier New" panose="02070309020205020404" pitchFamily="49" charset="0"/>
+              </a:rPr>
+              <a:t>, y = </a:t>
+            </a:r>
+            <a:r>
+              <a:rPr lang="en-US" sz="900" dirty="0" err="1">
+                <a:latin typeface="Courier New" panose="02070309020205020404" pitchFamily="49" charset="0"/>
+                <a:cs typeface="Courier New" panose="02070309020205020404" pitchFamily="49" charset="0"/>
+              </a:rPr>
+              <a:t>df$y</a:t>
+            </a:r>
+            <a:r>
+              <a:rPr lang="en-US" sz="900" dirty="0">
+                <a:latin typeface="Courier New" panose="02070309020205020404" pitchFamily="49" charset="0"/>
+                <a:cs typeface="Courier New" panose="02070309020205020404" pitchFamily="49" charset="0"/>
+              </a:rPr>
+              <a:t>, </a:t>
+            </a:r>
+            <a:r>
+              <a:rPr lang="en-US" sz="900" dirty="0" err="1">
+                <a:latin typeface="Courier New" panose="02070309020205020404" pitchFamily="49" charset="0"/>
+                <a:cs typeface="Courier New" panose="02070309020205020404" pitchFamily="49" charset="0"/>
+              </a:rPr>
+              <a:t>conf.level</a:t>
+            </a:r>
+            <a:r>
+              <a:rPr lang="en-US" sz="900" dirty="0">
+                <a:latin typeface="Courier New" panose="02070309020205020404" pitchFamily="49" charset="0"/>
+                <a:cs typeface="Courier New" panose="02070309020205020404" pitchFamily="49" charset="0"/>
+              </a:rPr>
+              <a:t> = </a:t>
+            </a:r>
+            <a:r>
+              <a:rPr lang="en-US" sz="900" dirty="0" err="1">
+                <a:latin typeface="Courier New" panose="02070309020205020404" pitchFamily="49" charset="0"/>
+                <a:cs typeface="Courier New" panose="02070309020205020404" pitchFamily="49" charset="0"/>
+              </a:rPr>
+              <a:t>conf</a:t>
+            </a:r>
+            <a:r>
+              <a:rPr lang="en-US" sz="900" dirty="0">
+                <a:latin typeface="Courier New" panose="02070309020205020404" pitchFamily="49" charset="0"/>
+                <a:cs typeface="Courier New" panose="02070309020205020404" pitchFamily="49" charset="0"/>
+              </a:rPr>
+              <a:t>, alternative = </a:t>
+            </a:r>
+            <a:r>
+              <a:rPr lang="en-US" sz="900" dirty="0" err="1">
+                <a:latin typeface="Courier New" panose="02070309020205020404" pitchFamily="49" charset="0"/>
+                <a:cs typeface="Courier New" panose="02070309020205020404" pitchFamily="49" charset="0"/>
+              </a:rPr>
+              <a:t>althyp</a:t>
+            </a:r>
+            <a:r>
+              <a:rPr lang="en-US" sz="900" dirty="0">
+                <a:latin typeface="Courier New" panose="02070309020205020404" pitchFamily="49" charset="0"/>
+                <a:cs typeface="Courier New" panose="02070309020205020404" pitchFamily="49" charset="0"/>
+              </a:rPr>
+              <a:t>, mu = </a:t>
+            </a:r>
+            <a:r>
+              <a:rPr lang="en-US" sz="900" dirty="0" err="1">
+                <a:latin typeface="Courier New" panose="02070309020205020404" pitchFamily="49" charset="0"/>
+                <a:cs typeface="Courier New" panose="02070309020205020404" pitchFamily="49" charset="0"/>
+              </a:rPr>
+              <a:t>hypval</a:t>
+            </a:r>
+            <a:r>
+              <a:rPr lang="en-US" sz="900" dirty="0">
+                <a:latin typeface="Courier New" panose="02070309020205020404" pitchFamily="49" charset="0"/>
+                <a:cs typeface="Courier New" panose="02070309020205020404" pitchFamily="49" charset="0"/>
+              </a:rPr>
+              <a:t>))</a:t>
+            </a:r>
+            <a:r>
+              <a:rPr lang="en-US" sz="900" dirty="0" smtClean="0">
+                <a:latin typeface="Courier New" panose="02070309020205020404" pitchFamily="49" charset="0"/>
+                <a:cs typeface="Courier New" panose="02070309020205020404" pitchFamily="49" charset="0"/>
+              </a:rPr>
+              <a:t>, </a:t>
+            </a:r>
+            <a:r>
+              <a:rPr lang="en-US" sz="900" dirty="0" err="1" smtClean="0">
+                <a:latin typeface="Courier New" panose="02070309020205020404" pitchFamily="49" charset="0"/>
+                <a:cs typeface="Courier New" panose="02070309020205020404" pitchFamily="49" charset="0"/>
+              </a:rPr>
+              <a:t>df</a:t>
+            </a:r>
+            <a:r>
+              <a:rPr lang="en-US" sz="900" dirty="0" smtClean="0">
+                <a:latin typeface="Courier New" panose="02070309020205020404" pitchFamily="49" charset="0"/>
+                <a:cs typeface="Courier New" panose="02070309020205020404" pitchFamily="49" charset="0"/>
+              </a:rPr>
+              <a:t> = quote</a:t>
+            </a:r>
+            <a:r>
+              <a:rPr lang="en-US" sz="900" dirty="0">
+                <a:latin typeface="Courier New" panose="02070309020205020404" pitchFamily="49" charset="0"/>
+                <a:cs typeface="Courier New" panose="02070309020205020404" pitchFamily="49" charset="0"/>
+              </a:rPr>
               <a:t>(</a:t>
             </a:r>
             <a:r>
@@ -4752,7 +4956,63 @@
                 <a:latin typeface="Courier New" panose="02070309020205020404" pitchFamily="49" charset="0"/>
                 <a:cs typeface="Courier New" panose="02070309020205020404" pitchFamily="49" charset="0"/>
               </a:rPr>
-              <a:t>, x, y, </a:t>
+              <a:t>)</a:t>
+            </a:r>
+            <a:r>
+              <a:rPr lang="en-US" sz="900" dirty="0" smtClean="0">
+                <a:latin typeface="Courier New" panose="02070309020205020404" pitchFamily="49" charset="0"/>
+                <a:cs typeface="Courier New" panose="02070309020205020404" pitchFamily="49" charset="0"/>
+              </a:rPr>
+              <a:t>, x </a:t>
+            </a:r>
+            <a:r>
+              <a:rPr lang="en-US" sz="900" dirty="0">
+                <a:latin typeface="Courier New" panose="02070309020205020404" pitchFamily="49" charset="0"/>
+                <a:cs typeface="Courier New" panose="02070309020205020404" pitchFamily="49" charset="0"/>
+              </a:rPr>
+              <a:t>= x</a:t>
+            </a:r>
+            <a:r>
+              <a:rPr lang="en-US" sz="900" dirty="0" smtClean="0">
+                <a:latin typeface="Courier New" panose="02070309020205020404" pitchFamily="49" charset="0"/>
+                <a:cs typeface="Courier New" panose="02070309020205020404" pitchFamily="49" charset="0"/>
+              </a:rPr>
+              <a:t>, y </a:t>
+            </a:r>
+            <a:r>
+              <a:rPr lang="en-US" sz="900" dirty="0">
+                <a:latin typeface="Courier New" panose="02070309020205020404" pitchFamily="49" charset="0"/>
+                <a:cs typeface="Courier New" panose="02070309020205020404" pitchFamily="49" charset="0"/>
+              </a:rPr>
+              <a:t>= y</a:t>
+            </a:r>
+            <a:r>
+              <a:rPr lang="en-US" sz="900" dirty="0" smtClean="0">
+                <a:latin typeface="Courier New" panose="02070309020205020404" pitchFamily="49" charset="0"/>
+                <a:cs typeface="Courier New" panose="02070309020205020404" pitchFamily="49" charset="0"/>
+              </a:rPr>
+              <a:t>, </a:t>
+            </a:r>
+            <a:r>
+              <a:rPr lang="en-US" sz="900" dirty="0" err="1" smtClean="0">
+                <a:latin typeface="Courier New" panose="02070309020205020404" pitchFamily="49" charset="0"/>
+                <a:cs typeface="Courier New" panose="02070309020205020404" pitchFamily="49" charset="0"/>
+              </a:rPr>
+              <a:t>conf</a:t>
+            </a:r>
+            <a:r>
+              <a:rPr lang="en-US" sz="900" dirty="0" smtClean="0">
+                <a:latin typeface="Courier New" panose="02070309020205020404" pitchFamily="49" charset="0"/>
+                <a:cs typeface="Courier New" panose="02070309020205020404" pitchFamily="49" charset="0"/>
+              </a:rPr>
+              <a:t> </a:t>
+            </a:r>
+            <a:r>
+              <a:rPr lang="en-US" sz="900" dirty="0">
+                <a:latin typeface="Courier New" panose="02070309020205020404" pitchFamily="49" charset="0"/>
+                <a:cs typeface="Courier New" panose="02070309020205020404" pitchFamily="49" charset="0"/>
+              </a:rPr>
+              <a:t>= </a:t>
             </a:r>
             <a:r>
               <a:rPr lang="en-US" sz="900" dirty="0" err="1">
@@ -4762,46 +5022,172 @@
               <a:t>conflevel</a:t>
             </a:r>
             <a:r>
+              <a:rPr lang="en-US" sz="900" dirty="0" smtClean="0">
+                <a:latin typeface="Courier New" panose="02070309020205020404" pitchFamily="49" charset="0"/>
+                <a:cs typeface="Courier New" panose="02070309020205020404" pitchFamily="49" charset="0"/>
+              </a:rPr>
+              <a:t>, </a:t>
+            </a:r>
+            <a:r>
+              <a:rPr lang="en-US" sz="900" dirty="0" err="1" smtClean="0">
+                <a:latin typeface="Courier New" panose="02070309020205020404" pitchFamily="49" charset="0"/>
+                <a:cs typeface="Courier New" panose="02070309020205020404" pitchFamily="49" charset="0"/>
+              </a:rPr>
+              <a:t>althyp</a:t>
+            </a:r>
+            <a:r>
+              <a:rPr lang="en-US" sz="900" dirty="0" smtClean="0">
+                <a:latin typeface="Courier New" panose="02070309020205020404" pitchFamily="49" charset="0"/>
+                <a:cs typeface="Courier New" panose="02070309020205020404" pitchFamily="49" charset="0"/>
+              </a:rPr>
+              <a:t> </a:t>
+            </a:r>
+            <a:r>
               <a:rPr lang="en-US" sz="900" dirty="0">
                 <a:latin typeface="Courier New" panose="02070309020205020404" pitchFamily="49" charset="0"/>
                 <a:cs typeface="Courier New" panose="02070309020205020404" pitchFamily="49" charset="0"/>
               </a:rPr>
+              <a:t>= </a:t>
+            </a:r>
+            <a:r>
+              <a:rPr lang="en-US" sz="900" dirty="0" err="1">
+                <a:latin typeface="Courier New" panose="02070309020205020404" pitchFamily="49" charset="0"/>
+                <a:cs typeface="Courier New" panose="02070309020205020404" pitchFamily="49" charset="0"/>
+              </a:rPr>
+              <a:t>althyp</a:t>
+            </a:r>
+            <a:r>
+              <a:rPr lang="en-US" sz="900" dirty="0" smtClean="0">
+                <a:latin typeface="Courier New" panose="02070309020205020404" pitchFamily="49" charset="0"/>
+                <a:cs typeface="Courier New" panose="02070309020205020404" pitchFamily="49" charset="0"/>
+              </a:rPr>
               <a:t>, </a:t>
             </a:r>
             <a:r>
+              <a:rPr lang="en-US" sz="900" dirty="0" err="1" smtClean="0">
+                <a:latin typeface="Courier New" panose="02070309020205020404" pitchFamily="49" charset="0"/>
+                <a:cs typeface="Courier New" panose="02070309020205020404" pitchFamily="49" charset="0"/>
+              </a:rPr>
+              <a:t>hypval</a:t>
+            </a:r>
+            <a:r>
+              <a:rPr lang="en-US" sz="900" dirty="0" smtClean="0">
+                <a:latin typeface="Courier New" panose="02070309020205020404" pitchFamily="49" charset="0"/>
+                <a:cs typeface="Courier New" panose="02070309020205020404" pitchFamily="49" charset="0"/>
+              </a:rPr>
+              <a:t> </a:t>
+            </a:r>
+            <a:r>
+              <a:rPr lang="en-US" sz="900" dirty="0">
+                <a:latin typeface="Courier New" panose="02070309020205020404" pitchFamily="49" charset="0"/>
+                <a:cs typeface="Courier New" panose="02070309020205020404" pitchFamily="49" charset="0"/>
+              </a:rPr>
+              <a:t>= </a:t>
+            </a:r>
+            <a:r>
               <a:rPr lang="en-US" sz="900" dirty="0" err="1">
                 <a:latin typeface="Courier New" panose="02070309020205020404" pitchFamily="49" charset="0"/>
                 <a:cs typeface="Courier New" panose="02070309020205020404" pitchFamily="49" charset="0"/>
               </a:rPr>
-              <a:t>althyp</a:t>
+              <a:t>hypval</a:t>
+            </a:r>
+            <a:r>
+              <a:rPr lang="en-US" sz="900" dirty="0" smtClean="0">
+                <a:latin typeface="Courier New" panose="02070309020205020404" pitchFamily="49" charset="0"/>
+                <a:cs typeface="Courier New" panose="02070309020205020404" pitchFamily="49" charset="0"/>
+              </a:rPr>
+              <a:t>, </a:t>
+            </a:r>
+            <a:r>
+              <a:rPr lang="en-US" sz="900" dirty="0" err="1" smtClean="0">
+                <a:latin typeface="Courier New" panose="02070309020205020404" pitchFamily="49" charset="0"/>
+                <a:cs typeface="Courier New" panose="02070309020205020404" pitchFamily="49" charset="0"/>
+              </a:rPr>
+              <a:t>mydir</a:t>
+            </a:r>
+            <a:r>
+              <a:rPr lang="en-US" sz="900" dirty="0" smtClean="0">
+                <a:latin typeface="Courier New" panose="02070309020205020404" pitchFamily="49" charset="0"/>
+                <a:cs typeface="Courier New" panose="02070309020205020404" pitchFamily="49" charset="0"/>
+              </a:rPr>
+              <a:t> </a:t>
             </a:r>
             <a:r>
               <a:rPr lang="en-US" sz="900" dirty="0">
                 <a:latin typeface="Courier New" panose="02070309020205020404" pitchFamily="49" charset="0"/>
                 <a:cs typeface="Courier New" panose="02070309020205020404" pitchFamily="49" charset="0"/>
               </a:rPr>
+              <a:t>= </a:t>
+            </a:r>
+            <a:r>
+              <a:rPr lang="en-US" sz="900" dirty="0" err="1">
+                <a:latin typeface="Courier New" panose="02070309020205020404" pitchFamily="49" charset="0"/>
+                <a:cs typeface="Courier New" panose="02070309020205020404" pitchFamily="49" charset="0"/>
+              </a:rPr>
+              <a:t>userdir</a:t>
+            </a:r>
+            <a:r>
+              <a:rPr lang="en-US" sz="900" dirty="0">
+                <a:latin typeface="Courier New" panose="02070309020205020404" pitchFamily="49" charset="0"/>
+                <a:cs typeface="Courier New" panose="02070309020205020404" pitchFamily="49" charset="0"/>
+              </a:rPr>
               <a:t>, </a:t>
             </a:r>
             <a:r>
+              <a:rPr lang="en-US" sz="900" dirty="0" smtClean="0">
+                <a:latin typeface="Courier New" panose="02070309020205020404" pitchFamily="49" charset="0"/>
+                <a:cs typeface="Courier New" panose="02070309020205020404" pitchFamily="49" charset="0"/>
+              </a:rPr>
+              <a:t>`_</a:t>
+            </a:r>
+            <a:r>
+              <a:rPr lang="en-US" sz="900" dirty="0" err="1" smtClean="0">
+                <a:latin typeface="Courier New" panose="02070309020205020404" pitchFamily="49" charset="0"/>
+                <a:cs typeface="Courier New" panose="02070309020205020404" pitchFamily="49" charset="0"/>
+              </a:rPr>
+              <a:t>env</a:t>
+            </a:r>
+            <a:r>
+              <a:rPr lang="en-US" sz="900" dirty="0">
+                <a:latin typeface="Courier New" panose="02070309020205020404" pitchFamily="49" charset="0"/>
+                <a:cs typeface="Courier New" panose="02070309020205020404" pitchFamily="49" charset="0"/>
+              </a:rPr>
+              <a:t>` = environment()</a:t>
+            </a:r>
+            <a:r>
+              <a:rPr lang="en-US" sz="900" dirty="0" smtClean="0">
+                <a:latin typeface="Courier New" panose="02070309020205020404" pitchFamily="49" charset="0"/>
+                <a:cs typeface="Courier New" panose="02070309020205020404" pitchFamily="49" charset="0"/>
+              </a:rPr>
+              <a:t>, file </a:t>
+            </a:r>
+            <a:r>
+              <a:rPr lang="en-US" sz="900" dirty="0">
+                <a:latin typeface="Courier New" panose="02070309020205020404" pitchFamily="49" charset="0"/>
+                <a:cs typeface="Courier New" panose="02070309020205020404" pitchFamily="49" charset="0"/>
+              </a:rPr>
+              <a:t>= "</a:t>
+            </a:r>
+            <a:r>
               <a:rPr lang="en-US" sz="900" dirty="0" err="1">
                 <a:latin typeface="Courier New" panose="02070309020205020404" pitchFamily="49" charset="0"/>
                 <a:cs typeface="Courier New" panose="02070309020205020404" pitchFamily="49" charset="0"/>
               </a:rPr>
-              <a:t>hypval</a:t>
+              <a:t>code_nonparametric.R</a:t>
             </a:r>
             <a:r>
               <a:rPr lang="en-US" sz="900" dirty="0">
                 <a:latin typeface="Courier New" panose="02070309020205020404" pitchFamily="49" charset="0"/>
                 <a:cs typeface="Courier New" panose="02070309020205020404" pitchFamily="49" charset="0"/>
               </a:rPr>
-              <a:t>) </a:t>
+              <a:t>"</a:t>
             </a:r>
             <a:r>
               <a:rPr lang="en-US" sz="900" dirty="0" smtClean="0">
                 <a:latin typeface="Courier New" panose="02070309020205020404" pitchFamily="49" charset="0"/>
                 <a:cs typeface="Courier New" panose="02070309020205020404" pitchFamily="49" charset="0"/>
               </a:rPr>
-              <a:t>{</a:t>
+              <a:t>)</a:t>
             </a:r>
           </a:p>
           <a:p>
@@ -4812,264 +5198,16 @@
           </a:p>
           <a:p>
             <a:r>
-              <a:rPr lang="en-US" sz="900" dirty="0" err="1" smtClean="0">
-                <a:latin typeface="Courier New" panose="02070309020205020404" pitchFamily="49" charset="0"/>
-                <a:cs typeface="Courier New" panose="02070309020205020404" pitchFamily="49" charset="0"/>
-              </a:rPr>
-              <a:t>cat_and_eval</a:t>
-            </a:r>
-            <a:r>
-              <a:rPr lang="en-US" sz="900" dirty="0" smtClean="0">
-                <a:latin typeface="Courier New" panose="02070309020205020404" pitchFamily="49" charset="0"/>
-                <a:cs typeface="Courier New" panose="02070309020205020404" pitchFamily="49" charset="0"/>
-              </a:rPr>
-              <a:t>(</a:t>
-            </a:r>
-          </a:p>
-          <a:p>
-            <a:pPr defTabSz="365760"/>
-            <a:r>
-              <a:rPr lang="en-US" sz="900" dirty="0" smtClean="0">
-                <a:latin typeface="Courier New" panose="02070309020205020404" pitchFamily="49" charset="0"/>
-                <a:cs typeface="Courier New" panose="02070309020205020404" pitchFamily="49" charset="0"/>
-              </a:rPr>
-              <a:t>paste0(</a:t>
-            </a:r>
-          </a:p>
-          <a:p>
-            <a:pPr defTabSz="365760"/>
-            <a:r>
-              <a:rPr lang="en-US" sz="900" dirty="0" smtClean="0">
-                <a:latin typeface="Courier New" panose="02070309020205020404" pitchFamily="49" charset="0"/>
-                <a:cs typeface="Courier New" panose="02070309020205020404" pitchFamily="49" charset="0"/>
-              </a:rPr>
-              <a:t>"</a:t>
-            </a:r>
-            <a:r>
-              <a:rPr lang="en-US" sz="900" dirty="0" err="1">
-                <a:latin typeface="Courier New" panose="02070309020205020404" pitchFamily="49" charset="0"/>
-                <a:cs typeface="Courier New" panose="02070309020205020404" pitchFamily="49" charset="0"/>
-              </a:rPr>
-              <a:t>wilcox.test</a:t>
-            </a:r>
-            <a:r>
-              <a:rPr lang="en-US" sz="900" dirty="0" smtClean="0">
-                <a:latin typeface="Courier New" panose="02070309020205020404" pitchFamily="49" charset="0"/>
-                <a:cs typeface="Courier New" panose="02070309020205020404" pitchFamily="49" charset="0"/>
-              </a:rPr>
-              <a:t>(</a:t>
-            </a:r>
-          </a:p>
-          <a:p>
-            <a:pPr defTabSz="365760"/>
-            <a:r>
-              <a:rPr lang="en-US" sz="900" dirty="0" smtClean="0">
-                <a:latin typeface="Courier New" panose="02070309020205020404" pitchFamily="49" charset="0"/>
-                <a:cs typeface="Courier New" panose="02070309020205020404" pitchFamily="49" charset="0"/>
-              </a:rPr>
-              <a:t>x=</a:t>
-            </a:r>
-            <a:r>
-              <a:rPr lang="en-US" sz="900" dirty="0" err="1" smtClean="0">
-                <a:latin typeface="Courier New" panose="02070309020205020404" pitchFamily="49" charset="0"/>
-                <a:cs typeface="Courier New" panose="02070309020205020404" pitchFamily="49" charset="0"/>
-              </a:rPr>
-              <a:t>intro.data</a:t>
-            </a:r>
-            <a:r>
               <a:rPr lang="en-US" sz="900" dirty="0">
                 <a:latin typeface="Courier New" panose="02070309020205020404" pitchFamily="49" charset="0"/>
                 <a:cs typeface="Courier New" panose="02070309020205020404" pitchFamily="49" charset="0"/>
               </a:rPr>
-              <a:t>[,'", x, "'], y=</a:t>
-            </a:r>
-            <a:r>
-              <a:rPr lang="en-US" sz="900" dirty="0" err="1">
-                <a:latin typeface="Courier New" panose="02070309020205020404" pitchFamily="49" charset="0"/>
-                <a:cs typeface="Courier New" panose="02070309020205020404" pitchFamily="49" charset="0"/>
-              </a:rPr>
-              <a:t>intro.data</a:t>
-            </a:r>
-            <a:r>
-              <a:rPr lang="en-US" sz="900" dirty="0">
-                <a:latin typeface="Courier New" panose="02070309020205020404" pitchFamily="49" charset="0"/>
-                <a:cs typeface="Courier New" panose="02070309020205020404" pitchFamily="49" charset="0"/>
-              </a:rPr>
-              <a:t>[,'", y, "'], </a:t>
-            </a:r>
-            <a:r>
-              <a:rPr lang="en-US" sz="900" dirty="0" err="1">
-                <a:latin typeface="Courier New" panose="02070309020205020404" pitchFamily="49" charset="0"/>
-                <a:cs typeface="Courier New" panose="02070309020205020404" pitchFamily="49" charset="0"/>
-              </a:rPr>
-              <a:t>conf.level</a:t>
-            </a:r>
-            <a:r>
-              <a:rPr lang="en-US" sz="900" dirty="0">
-                <a:latin typeface="Courier New" panose="02070309020205020404" pitchFamily="49" charset="0"/>
-                <a:cs typeface="Courier New" panose="02070309020205020404" pitchFamily="49" charset="0"/>
-              </a:rPr>
-              <a:t>=", </a:t>
-            </a:r>
-            <a:r>
-              <a:rPr lang="en-US" sz="900" dirty="0" err="1">
-                <a:latin typeface="Courier New" panose="02070309020205020404" pitchFamily="49" charset="0"/>
-                <a:cs typeface="Courier New" panose="02070309020205020404" pitchFamily="49" charset="0"/>
-              </a:rPr>
-              <a:t>conflevel</a:t>
-            </a:r>
-            <a:r>
-              <a:rPr lang="en-US" sz="900" dirty="0">
-                <a:latin typeface="Courier New" panose="02070309020205020404" pitchFamily="49" charset="0"/>
-                <a:cs typeface="Courier New" panose="02070309020205020404" pitchFamily="49" charset="0"/>
-              </a:rPr>
-              <a:t>, ", alternative='", </a:t>
-            </a:r>
-            <a:r>
-              <a:rPr lang="en-US" sz="900" dirty="0" err="1">
-                <a:latin typeface="Courier New" panose="02070309020205020404" pitchFamily="49" charset="0"/>
-                <a:cs typeface="Courier New" panose="02070309020205020404" pitchFamily="49" charset="0"/>
-              </a:rPr>
-              <a:t>althyp</a:t>
-            </a:r>
-            <a:r>
-              <a:rPr lang="en-US" sz="900" dirty="0">
-                <a:latin typeface="Courier New" panose="02070309020205020404" pitchFamily="49" charset="0"/>
-                <a:cs typeface="Courier New" panose="02070309020205020404" pitchFamily="49" charset="0"/>
-              </a:rPr>
-              <a:t>, "', mu=", </a:t>
-            </a:r>
-            <a:r>
-              <a:rPr lang="en-US" sz="900" dirty="0" err="1">
-                <a:latin typeface="Courier New" panose="02070309020205020404" pitchFamily="49" charset="0"/>
-                <a:cs typeface="Courier New" panose="02070309020205020404" pitchFamily="49" charset="0"/>
-              </a:rPr>
-              <a:t>hypval</a:t>
-            </a:r>
-            <a:r>
-              <a:rPr lang="en-US" sz="900" dirty="0">
-                <a:latin typeface="Courier New" panose="02070309020205020404" pitchFamily="49" charset="0"/>
-                <a:cs typeface="Courier New" panose="02070309020205020404" pitchFamily="49" charset="0"/>
-              </a:rPr>
-              <a:t>, ")"),  </a:t>
-            </a:r>
-            <a:endParaRPr lang="en-US" sz="900" dirty="0" smtClean="0">
+              <a:t>}</a:t>
+            </a:r>
+            <a:endParaRPr lang="en-US" sz="900" dirty="0">
               <a:latin typeface="Courier New" panose="02070309020205020404" pitchFamily="49" charset="0"/>
               <a:cs typeface="Courier New" panose="02070309020205020404" pitchFamily="49" charset="0"/>
             </a:endParaRPr>
-          </a:p>
-          <a:p>
-            <a:pPr defTabSz="365760"/>
-            <a:r>
-              <a:rPr lang="en-US" sz="900" dirty="0" err="1" smtClean="0">
-                <a:latin typeface="Courier New" panose="02070309020205020404" pitchFamily="49" charset="0"/>
-                <a:cs typeface="Courier New" panose="02070309020205020404" pitchFamily="49" charset="0"/>
-              </a:rPr>
-              <a:t>mydir</a:t>
-            </a:r>
-            <a:r>
-              <a:rPr lang="en-US" sz="900" dirty="0" smtClean="0">
-                <a:latin typeface="Courier New" panose="02070309020205020404" pitchFamily="49" charset="0"/>
-                <a:cs typeface="Courier New" panose="02070309020205020404" pitchFamily="49" charset="0"/>
-              </a:rPr>
-              <a:t> </a:t>
-            </a:r>
-            <a:r>
-              <a:rPr lang="en-US" sz="900" dirty="0">
-                <a:latin typeface="Courier New" panose="02070309020205020404" pitchFamily="49" charset="0"/>
-                <a:cs typeface="Courier New" panose="02070309020205020404" pitchFamily="49" charset="0"/>
-              </a:rPr>
-              <a:t>= </a:t>
-            </a:r>
-            <a:r>
-              <a:rPr lang="en-US" sz="900" dirty="0" err="1">
-                <a:latin typeface="Courier New" panose="02070309020205020404" pitchFamily="49" charset="0"/>
-                <a:cs typeface="Courier New" panose="02070309020205020404" pitchFamily="49" charset="0"/>
-              </a:rPr>
-              <a:t>userdir</a:t>
-            </a:r>
-            <a:r>
-              <a:rPr lang="en-US" sz="900" dirty="0">
-                <a:latin typeface="Courier New" panose="02070309020205020404" pitchFamily="49" charset="0"/>
-                <a:cs typeface="Courier New" panose="02070309020205020404" pitchFamily="49" charset="0"/>
-              </a:rPr>
-              <a:t>, </a:t>
-            </a:r>
-            <a:endParaRPr lang="en-US" sz="900" dirty="0" smtClean="0">
-              <a:latin typeface="Courier New" panose="02070309020205020404" pitchFamily="49" charset="0"/>
-              <a:cs typeface="Courier New" panose="02070309020205020404" pitchFamily="49" charset="0"/>
-            </a:endParaRPr>
-          </a:p>
-          <a:p>
-            <a:pPr defTabSz="365760"/>
-            <a:r>
-              <a:rPr lang="en-US" sz="900" dirty="0" err="1" smtClean="0">
-                <a:latin typeface="Courier New" panose="02070309020205020404" pitchFamily="49" charset="0"/>
-                <a:cs typeface="Courier New" panose="02070309020205020404" pitchFamily="49" charset="0"/>
-              </a:rPr>
-              <a:t>env</a:t>
-            </a:r>
-            <a:r>
-              <a:rPr lang="en-US" sz="900" dirty="0" smtClean="0">
-                <a:latin typeface="Courier New" panose="02070309020205020404" pitchFamily="49" charset="0"/>
-                <a:cs typeface="Courier New" panose="02070309020205020404" pitchFamily="49" charset="0"/>
-              </a:rPr>
-              <a:t> </a:t>
-            </a:r>
-            <a:r>
-              <a:rPr lang="en-US" sz="900" dirty="0">
-                <a:latin typeface="Courier New" panose="02070309020205020404" pitchFamily="49" charset="0"/>
-                <a:cs typeface="Courier New" panose="02070309020205020404" pitchFamily="49" charset="0"/>
-              </a:rPr>
-              <a:t>= environment</a:t>
-            </a:r>
-            <a:r>
-              <a:rPr lang="en-US" sz="900" dirty="0" smtClean="0">
-                <a:latin typeface="Courier New" panose="02070309020205020404" pitchFamily="49" charset="0"/>
-                <a:cs typeface="Courier New" panose="02070309020205020404" pitchFamily="49" charset="0"/>
-              </a:rPr>
-              <a:t>(),</a:t>
-            </a:r>
-          </a:p>
-          <a:p>
-            <a:pPr defTabSz="365760"/>
-            <a:r>
-              <a:rPr lang="en-US" sz="900" dirty="0" smtClean="0">
-                <a:latin typeface="Courier New" panose="02070309020205020404" pitchFamily="49" charset="0"/>
-                <a:cs typeface="Courier New" panose="02070309020205020404" pitchFamily="49" charset="0"/>
-              </a:rPr>
-              <a:t> </a:t>
-            </a:r>
-            <a:r>
-              <a:rPr lang="en-US" sz="900" dirty="0">
-                <a:latin typeface="Courier New" panose="02070309020205020404" pitchFamily="49" charset="0"/>
-                <a:cs typeface="Courier New" panose="02070309020205020404" pitchFamily="49" charset="0"/>
-              </a:rPr>
-              <a:t>file = "</a:t>
-            </a:r>
-            <a:r>
-              <a:rPr lang="en-US" sz="900" dirty="0" err="1">
-                <a:latin typeface="Courier New" panose="02070309020205020404" pitchFamily="49" charset="0"/>
-                <a:cs typeface="Courier New" panose="02070309020205020404" pitchFamily="49" charset="0"/>
-              </a:rPr>
-              <a:t>code_nonparametric.R</a:t>
-            </a:r>
-            <a:r>
-              <a:rPr lang="en-US" sz="900" dirty="0">
-                <a:latin typeface="Courier New" panose="02070309020205020404" pitchFamily="49" charset="0"/>
-                <a:cs typeface="Courier New" panose="02070309020205020404" pitchFamily="49" charset="0"/>
-              </a:rPr>
-              <a:t>")</a:t>
-            </a:r>
-          </a:p>
-          <a:p>
-            <a:r>
-              <a:rPr lang="en-US" sz="900" dirty="0">
-                <a:latin typeface="Courier New" panose="02070309020205020404" pitchFamily="49" charset="0"/>
-                <a:cs typeface="Courier New" panose="02070309020205020404" pitchFamily="49" charset="0"/>
-              </a:rPr>
-              <a:t>}</a:t>
-            </a:r>
           </a:p>
         </p:txBody>
       </p:sp>
@@ -5106,7 +5244,20 @@
                 <a:latin typeface="Cambria Math" panose="02040503050406030204" pitchFamily="18" charset="0"/>
                 <a:ea typeface="Cambria Math" panose="02040503050406030204" pitchFamily="18" charset="0"/>
               </a:rPr>
-              <a:t>statistics/nonparametric/</a:t>
+              <a:t>inference/</a:t>
+            </a:r>
+            <a:r>
+              <a:rPr lang="en-US" sz="1400" dirty="0" smtClean="0">
+                <a:solidFill>
+                  <a:schemeClr val="tx1">
+                    <a:lumMod val="65000"/>
+                    <a:lumOff val="35000"/>
+                  </a:schemeClr>
+                </a:solidFill>
+                <a:latin typeface="Cambria Math" panose="02040503050406030204" pitchFamily="18" charset="0"/>
+                <a:ea typeface="Cambria Math" panose="02040503050406030204" pitchFamily="18" charset="0"/>
+              </a:rPr>
+              <a:t>nonparametric/</a:t>
             </a:r>
             <a:endParaRPr lang="en-US" sz="1400" dirty="0">
               <a:solidFill>
@@ -5154,7 +5305,20 @@
                 <a:latin typeface="Cambria Math" panose="02040503050406030204" pitchFamily="18" charset="0"/>
                 <a:ea typeface="Cambria Math" panose="02040503050406030204" pitchFamily="18" charset="0"/>
               </a:rPr>
-              <a:t>statistics/nonparametric/</a:t>
+              <a:t>inference/</a:t>
+            </a:r>
+            <a:r>
+              <a:rPr lang="en-US" sz="1400" dirty="0" smtClean="0">
+                <a:solidFill>
+                  <a:schemeClr val="tx1">
+                    <a:lumMod val="65000"/>
+                    <a:lumOff val="35000"/>
+                  </a:schemeClr>
+                </a:solidFill>
+                <a:latin typeface="Cambria Math" panose="02040503050406030204" pitchFamily="18" charset="0"/>
+                <a:ea typeface="Cambria Math" panose="02040503050406030204" pitchFamily="18" charset="0"/>
+              </a:rPr>
+              <a:t>nonparametric/</a:t>
             </a:r>
             <a:endParaRPr lang="en-US" sz="1400" dirty="0">
               <a:solidFill>
@@ -5674,7 +5838,7 @@
         <p:spPr>
           <a:xfrm>
             <a:off x="3293194" y="3304883"/>
-            <a:ext cx="2294805" cy="1615827"/>
+            <a:ext cx="2294805" cy="1446550"/>
           </a:xfrm>
           <a:prstGeom prst="rect">
             <a:avLst/>
@@ -5688,18 +5852,34 @@
           <a:lstStyle/>
           <a:p>
             <a:r>
+              <a:rPr lang="en-US" sz="1100" dirty="0" smtClean="0">
+                <a:latin typeface="Courier New" panose="02070309020205020404" pitchFamily="49" charset="0"/>
+                <a:cs typeface="Courier New" panose="02070309020205020404" pitchFamily="49" charset="0"/>
+              </a:rPr>
+              <a:t>data</a:t>
+            </a:r>
+            <a:r>
+              <a:rPr lang="en-US" sz="1100" dirty="0" smtClean="0">
+                <a:latin typeface="Courier New" panose="02070309020205020404" pitchFamily="49" charset="0"/>
+                <a:cs typeface="Courier New" panose="02070309020205020404" pitchFamily="49" charset="0"/>
+              </a:rPr>
+              <a:t>/sources</a:t>
+            </a:r>
+          </a:p>
+          <a:p>
+            <a:r>
               <a:rPr lang="en-US" sz="1100" dirty="0">
                 <a:latin typeface="Courier New" panose="02070309020205020404" pitchFamily="49" charset="0"/>
                 <a:cs typeface="Courier New" panose="02070309020205020404" pitchFamily="49" charset="0"/>
               </a:rPr>
-              <a:t>h</a:t>
+              <a:t>d</a:t>
             </a:r>
             <a:r>
               <a:rPr lang="en-US" sz="1100" dirty="0" smtClean="0">
                 <a:latin typeface="Courier New" panose="02070309020205020404" pitchFamily="49" charset="0"/>
                 <a:cs typeface="Courier New" panose="02070309020205020404" pitchFamily="49" charset="0"/>
               </a:rPr>
-              <a:t>eading/module</a:t>
+              <a:t>ata/transform</a:t>
             </a:r>
           </a:p>
           <a:p>
@@ -5708,14 +5888,14 @@
                 <a:latin typeface="Courier New" panose="02070309020205020404" pitchFamily="49" charset="0"/>
                 <a:cs typeface="Courier New" panose="02070309020205020404" pitchFamily="49" charset="0"/>
               </a:rPr>
-              <a:t>d</a:t>
+              <a:t>s</a:t>
             </a:r>
             <a:r>
               <a:rPr lang="en-US" sz="1100" dirty="0" smtClean="0">
                 <a:latin typeface="Courier New" panose="02070309020205020404" pitchFamily="49" charset="0"/>
                 <a:cs typeface="Courier New" panose="02070309020205020404" pitchFamily="49" charset="0"/>
               </a:rPr>
-              <a:t>ata/sources</a:t>
+              <a:t>ummaries/graphical</a:t>
             </a:r>
           </a:p>
           <a:p>
@@ -5724,30 +5904,21 @@
                 <a:latin typeface="Courier New" panose="02070309020205020404" pitchFamily="49" charset="0"/>
                 <a:cs typeface="Courier New" panose="02070309020205020404" pitchFamily="49" charset="0"/>
               </a:rPr>
-              <a:t>d</a:t>
+              <a:t>s</a:t>
             </a:r>
             <a:r>
               <a:rPr lang="en-US" sz="1100" dirty="0" smtClean="0">
                 <a:latin typeface="Courier New" panose="02070309020205020404" pitchFamily="49" charset="0"/>
                 <a:cs typeface="Courier New" panose="02070309020205020404" pitchFamily="49" charset="0"/>
               </a:rPr>
-              <a:t>ata/transform</a:t>
-            </a:r>
-          </a:p>
-          <a:p>
-            <a:r>
-              <a:rPr lang="en-US" sz="1100" dirty="0">
-                <a:latin typeface="Courier New" panose="02070309020205020404" pitchFamily="49" charset="0"/>
-                <a:cs typeface="Courier New" panose="02070309020205020404" pitchFamily="49" charset="0"/>
-              </a:rPr>
-              <a:t>s</a:t>
+              <a:t>ummaries</a:t>
             </a:r>
             <a:r>
               <a:rPr lang="en-US" sz="1100" dirty="0" smtClean="0">
                 <a:latin typeface="Courier New" panose="02070309020205020404" pitchFamily="49" charset="0"/>
                 <a:cs typeface="Courier New" panose="02070309020205020404" pitchFamily="49" charset="0"/>
               </a:rPr>
-              <a:t>ummaries/graphical</a:t>
+              <a:t>/numerical</a:t>
             </a:r>
           </a:p>
           <a:p>
@@ -5756,55 +5927,39 @@
                 <a:latin typeface="Courier New" panose="02070309020205020404" pitchFamily="49" charset="0"/>
                 <a:cs typeface="Courier New" panose="02070309020205020404" pitchFamily="49" charset="0"/>
               </a:rPr>
-              <a:t>Summaries/numerical</a:t>
-            </a:r>
-          </a:p>
-          <a:p>
-            <a:r>
-              <a:rPr lang="en-US" sz="1100" dirty="0">
-                <a:latin typeface="Courier New" panose="02070309020205020404" pitchFamily="49" charset="0"/>
-                <a:cs typeface="Courier New" panose="02070309020205020404" pitchFamily="49" charset="0"/>
-              </a:rPr>
-              <a:t>s</a:t>
+              <a:t>inference/</a:t>
             </a:r>
             <a:r>
               <a:rPr lang="en-US" sz="1100" dirty="0" smtClean="0">
                 <a:latin typeface="Courier New" panose="02070309020205020404" pitchFamily="49" charset="0"/>
                 <a:cs typeface="Courier New" panose="02070309020205020404" pitchFamily="49" charset="0"/>
               </a:rPr>
-              <a:t>tatistics/contingency</a:t>
-            </a:r>
-          </a:p>
-          <a:p>
-            <a:r>
-              <a:rPr lang="en-US" sz="1100" dirty="0">
-                <a:latin typeface="Courier New" panose="02070309020205020404" pitchFamily="49" charset="0"/>
-                <a:cs typeface="Courier New" panose="02070309020205020404" pitchFamily="49" charset="0"/>
-              </a:rPr>
-              <a:t>s</a:t>
-            </a:r>
+              <a:t>contingency</a:t>
+            </a:r>
+          </a:p>
+          <a:p>
             <a:r>
               <a:rPr lang="en-US" sz="1100" dirty="0" smtClean="0">
                 <a:latin typeface="Courier New" panose="02070309020205020404" pitchFamily="49" charset="0"/>
                 <a:cs typeface="Courier New" panose="02070309020205020404" pitchFamily="49" charset="0"/>
               </a:rPr>
-              <a:t>tatistics/regression</a:t>
-            </a:r>
-          </a:p>
-          <a:p>
-            <a:r>
-              <a:rPr lang="en-US" sz="1100" dirty="0">
-                <a:latin typeface="Courier New" panose="02070309020205020404" pitchFamily="49" charset="0"/>
-                <a:cs typeface="Courier New" panose="02070309020205020404" pitchFamily="49" charset="0"/>
-              </a:rPr>
-              <a:t>s</a:t>
+              <a:t>inference/</a:t>
             </a:r>
             <a:r>
               <a:rPr lang="en-US" sz="1100" dirty="0" smtClean="0">
                 <a:latin typeface="Courier New" panose="02070309020205020404" pitchFamily="49" charset="0"/>
                 <a:cs typeface="Courier New" panose="02070309020205020404" pitchFamily="49" charset="0"/>
               </a:rPr>
-              <a:t>tatistics/</a:t>
+              <a:t>regression</a:t>
+            </a:r>
+          </a:p>
+          <a:p>
+            <a:r>
+              <a:rPr lang="en-US" sz="1100" dirty="0" smtClean="0">
+                <a:latin typeface="Courier New" panose="02070309020205020404" pitchFamily="49" charset="0"/>
+                <a:cs typeface="Courier New" panose="02070309020205020404" pitchFamily="49" charset="0"/>
+              </a:rPr>
+              <a:t>inference/</a:t>
             </a:r>
             <a:r>
               <a:rPr lang="en-US" sz="1100" dirty="0" err="1" smtClean="0">
@@ -5820,16 +5975,6 @@
           </a:p>
           <a:p>
             <a:r>
-              <a:rPr lang="en-US" sz="1100" dirty="0">
-                <a:solidFill>
-                  <a:srgbClr val="FF0000"/>
-                </a:solidFill>
-                <a:latin typeface="Courier New" panose="02070309020205020404" pitchFamily="49" charset="0"/>
-                <a:cs typeface="Courier New" panose="02070309020205020404" pitchFamily="49" charset="0"/>
-              </a:rPr>
-              <a:t>s</a:t>
-            </a:r>
-            <a:r>
               <a:rPr lang="en-US" sz="1100" dirty="0" smtClean="0">
                 <a:solidFill>
                   <a:srgbClr val="FF0000"/>
@@ -5837,7 +5982,17 @@
                 <a:latin typeface="Courier New" panose="02070309020205020404" pitchFamily="49" charset="0"/>
                 <a:cs typeface="Courier New" panose="02070309020205020404" pitchFamily="49" charset="0"/>
               </a:rPr>
-              <a:t>tatistics/nonparametric</a:t>
+              <a:t>inference/</a:t>
+            </a:r>
+            <a:r>
+              <a:rPr lang="en-US" sz="1100" dirty="0" smtClean="0">
+                <a:solidFill>
+                  <a:srgbClr val="FF0000"/>
+                </a:solidFill>
+                <a:latin typeface="Courier New" panose="02070309020205020404" pitchFamily="49" charset="0"/>
+                <a:cs typeface="Courier New" panose="02070309020205020404" pitchFamily="49" charset="0"/>
+              </a:rPr>
+              <a:t>nonparametric</a:t>
             </a:r>
             <a:endParaRPr lang="en-US" sz="1100" dirty="0">
               <a:solidFill>

</xml_diff>